<commit_message>
Updated for latest tools
</commit_message>
<xml_diff>
--- a/docs/Slides/CIS399Wk2Day4-MultipleActivities.pptx
+++ b/docs/Slides/CIS399Wk2Day4-MultipleActivities.pptx
@@ -227,7 +227,7 @@
           <a:p>
             <a:fld id="{1FC32AA1-1225-9048-80C3-2B6F58548154}" type="datetimeFigureOut">
               <a:rPr lang="en-US" smtClean="0"/>
-              <a:t>7/5/18</a:t>
+              <a:t>7/8/19</a:t>
             </a:fld>
             <a:endParaRPr lang="en-US"/>
           </a:p>
@@ -1477,7 +1477,7 @@
           <a:p>
             <a:fld id="{12110144-19AD-4D4E-902D-E18AF93089D3}" type="datetimeFigureOut">
               <a:rPr lang="en-US" smtClean="0"/>
-              <a:t>7/5/18</a:t>
+              <a:t>7/8/19</a:t>
             </a:fld>
             <a:endParaRPr lang="en-US"/>
           </a:p>
@@ -1645,7 +1645,7 @@
           <a:p>
             <a:fld id="{12110144-19AD-4D4E-902D-E18AF93089D3}" type="datetimeFigureOut">
               <a:rPr lang="en-US" smtClean="0"/>
-              <a:t>7/5/18</a:t>
+              <a:t>7/8/19</a:t>
             </a:fld>
             <a:endParaRPr lang="en-US"/>
           </a:p>
@@ -1823,7 +1823,7 @@
           <a:p>
             <a:fld id="{12110144-19AD-4D4E-902D-E18AF93089D3}" type="datetimeFigureOut">
               <a:rPr lang="en-US" smtClean="0"/>
-              <a:t>7/5/18</a:t>
+              <a:t>7/8/19</a:t>
             </a:fld>
             <a:endParaRPr lang="en-US"/>
           </a:p>
@@ -1991,7 +1991,7 @@
           <a:p>
             <a:fld id="{12110144-19AD-4D4E-902D-E18AF93089D3}" type="datetimeFigureOut">
               <a:rPr lang="en-US" smtClean="0"/>
-              <a:t>7/5/18</a:t>
+              <a:t>7/8/19</a:t>
             </a:fld>
             <a:endParaRPr lang="en-US"/>
           </a:p>
@@ -2236,7 +2236,7 @@
           <a:p>
             <a:fld id="{12110144-19AD-4D4E-902D-E18AF93089D3}" type="datetimeFigureOut">
               <a:rPr lang="en-US" smtClean="0"/>
-              <a:t>7/5/18</a:t>
+              <a:t>7/8/19</a:t>
             </a:fld>
             <a:endParaRPr lang="en-US"/>
           </a:p>
@@ -2521,7 +2521,7 @@
           <a:p>
             <a:fld id="{12110144-19AD-4D4E-902D-E18AF93089D3}" type="datetimeFigureOut">
               <a:rPr lang="en-US" smtClean="0"/>
-              <a:t>7/5/18</a:t>
+              <a:t>7/8/19</a:t>
             </a:fld>
             <a:endParaRPr lang="en-US"/>
           </a:p>
@@ -2940,7 +2940,7 @@
           <a:p>
             <a:fld id="{12110144-19AD-4D4E-902D-E18AF93089D3}" type="datetimeFigureOut">
               <a:rPr lang="en-US" smtClean="0"/>
-              <a:t>7/5/18</a:t>
+              <a:t>7/8/19</a:t>
             </a:fld>
             <a:endParaRPr lang="en-US"/>
           </a:p>
@@ -3057,7 +3057,7 @@
           <a:p>
             <a:fld id="{12110144-19AD-4D4E-902D-E18AF93089D3}" type="datetimeFigureOut">
               <a:rPr lang="en-US" smtClean="0"/>
-              <a:t>7/5/18</a:t>
+              <a:t>7/8/19</a:t>
             </a:fld>
             <a:endParaRPr lang="en-US"/>
           </a:p>
@@ -3152,7 +3152,7 @@
           <a:p>
             <a:fld id="{12110144-19AD-4D4E-902D-E18AF93089D3}" type="datetimeFigureOut">
               <a:rPr lang="en-US" smtClean="0"/>
-              <a:t>7/5/18</a:t>
+              <a:t>7/8/19</a:t>
             </a:fld>
             <a:endParaRPr lang="en-US"/>
           </a:p>
@@ -3427,7 +3427,7 @@
           <a:p>
             <a:fld id="{12110144-19AD-4D4E-902D-E18AF93089D3}" type="datetimeFigureOut">
               <a:rPr lang="en-US" smtClean="0"/>
-              <a:t>7/5/18</a:t>
+              <a:t>7/8/19</a:t>
             </a:fld>
             <a:endParaRPr lang="en-US"/>
           </a:p>
@@ -3679,7 +3679,7 @@
           <a:p>
             <a:fld id="{12110144-19AD-4D4E-902D-E18AF93089D3}" type="datetimeFigureOut">
               <a:rPr lang="en-US" smtClean="0"/>
-              <a:t>7/5/18</a:t>
+              <a:t>7/8/19</a:t>
             </a:fld>
             <a:endParaRPr lang="en-US"/>
           </a:p>
@@ -3908,7 +3908,7 @@
           <a:p>
             <a:fld id="{12110144-19AD-4D4E-902D-E18AF93089D3}" type="datetimeFigureOut">
               <a:rPr lang="en-US" smtClean="0"/>
-              <a:t>7/5/18</a:t>
+              <a:t>7/8/19</a:t>
             </a:fld>
             <a:endParaRPr lang="en-US"/>
           </a:p>
@@ -6092,7 +6092,24 @@
                 </a:solidFill>
                 <a:latin typeface="Menlo"/>
               </a:rPr>
-              <a:t>, </a:t>
+              <a:t>,</a:t>
+            </a:r>
+            <a:br>
+              <a:rPr lang="en-US" sz="2900" dirty="0">
+                <a:solidFill>
+                  <a:srgbClr val="000000"/>
+                </a:solidFill>
+                <a:latin typeface="Menlo"/>
+              </a:rPr>
+            </a:br>
+            <a:r>
+              <a:rPr lang="en-US" sz="2900" dirty="0">
+                <a:solidFill>
+                  <a:srgbClr val="000000"/>
+                </a:solidFill>
+                <a:latin typeface="Menlo"/>
+              </a:rPr>
+              <a:t>                  </a:t>
             </a:r>
             <a:r>
               <a:rPr lang="en-US" sz="2900" dirty="0" err="1">
@@ -6393,7 +6410,15 @@
             <a:pPr lvl="1"/>
             <a:r>
               <a:rPr lang="en-US" dirty="0"/>
-              <a:t>Or, adding a Toolbar to the activity (see the following slides)</a:t>
+              <a:t>Or, using an activity that inherits from </a:t>
+            </a:r>
+            <a:r>
+              <a:rPr lang="en-US" dirty="0" err="1"/>
+              <a:t>AppCompatActivity</a:t>
+            </a:r>
+            <a:r>
+              <a:rPr lang="en-US" dirty="0"/>
+              <a:t>)</a:t>
             </a:r>
           </a:p>
           <a:p>
@@ -6644,7 +6669,7 @@
 </file>
 
 <file path=ppt/slides/slide19.xml><?xml version="1.0" encoding="utf-8"?>
-<p:sld xmlns:a="http://schemas.openxmlformats.org/drawingml/2006/main" xmlns:r="http://schemas.openxmlformats.org/officeDocument/2006/relationships" xmlns:p="http://schemas.openxmlformats.org/presentationml/2006/main">
+<p:sld xmlns:a="http://schemas.openxmlformats.org/drawingml/2006/main" xmlns:r="http://schemas.openxmlformats.org/officeDocument/2006/relationships" xmlns:p="http://schemas.openxmlformats.org/presentationml/2006/main" show="0">
   <p:cSld>
     <p:bg>
       <p:bgPr>
@@ -8811,7 +8836,7 @@
             <a:pPr lvl="2"/>
             <a:r>
               <a:rPr lang="en-US" dirty="0"/>
-              <a:t>Each screen is managed by it’s own activity</a:t>
+              <a:t>Each screen is managed by an activity</a:t>
             </a:r>
           </a:p>
           <a:p>
@@ -10045,7 +10070,7 @@
             <a:pPr lvl="1"/>
             <a:r>
               <a:rPr lang="en-US" dirty="0"/>
-              <a:t>Creating new views (widgets, aka controls)</a:t>
+              <a:t>Creating new View objects (layouts or widgets)</a:t>
             </a:r>
           </a:p>
           <a:p>

</xml_diff>